<commit_message>
Updated Code for Buzzer
</commit_message>
<xml_diff>
--- a/Hazardous Gas Detection and Alarm System (GDAS).pptx
+++ b/Hazardous Gas Detection and Alarm System (GDAS).pptx
@@ -111,6 +111,11 @@
       </a:defRPr>
     </a:lvl9pPr>
   </p:defaultTextStyle>
+  <p:extLst>
+    <p:ext uri="{EFAFB233-063F-42B5-8137-9DF3F51BA10A}">
+      <p15:sldGuideLst xmlns:p15="http://schemas.microsoft.com/office/powerpoint/2012/main"/>
+    </p:ext>
+  </p:extLst>
 </p:presentation>
 </file>
 
@@ -859,7 +864,7 @@
           <a:p>
             <a:fld id="{4E50B8B5-583C-4517-BD43-114C0DBA7601}" type="datetimeFigureOut">
               <a:rPr lang="en-IN" smtClean="0"/>
-              <a:t>19-03-2025</a:t>
+              <a:t>20-03-2025</a:t>
             </a:fld>
             <a:endParaRPr lang="en-IN"/>
           </a:p>
@@ -1110,7 +1115,7 @@
           <a:p>
             <a:fld id="{4E50B8B5-583C-4517-BD43-114C0DBA7601}" type="datetimeFigureOut">
               <a:rPr lang="en-IN" smtClean="0"/>
-              <a:t>19-03-2025</a:t>
+              <a:t>20-03-2025</a:t>
             </a:fld>
             <a:endParaRPr lang="en-IN"/>
           </a:p>
@@ -1424,7 +1429,7 @@
           <a:p>
             <a:fld id="{4E50B8B5-583C-4517-BD43-114C0DBA7601}" type="datetimeFigureOut">
               <a:rPr lang="en-IN" smtClean="0"/>
-              <a:t>19-03-2025</a:t>
+              <a:t>20-03-2025</a:t>
             </a:fld>
             <a:endParaRPr lang="en-IN"/>
           </a:p>
@@ -1757,7 +1762,7 @@
           <a:p>
             <a:fld id="{4E50B8B5-583C-4517-BD43-114C0DBA7601}" type="datetimeFigureOut">
               <a:rPr lang="en-IN" smtClean="0"/>
-              <a:t>19-03-2025</a:t>
+              <a:t>20-03-2025</a:t>
             </a:fld>
             <a:endParaRPr lang="en-IN"/>
           </a:p>
@@ -2071,7 +2076,7 @@
           <a:p>
             <a:fld id="{4E50B8B5-583C-4517-BD43-114C0DBA7601}" type="datetimeFigureOut">
               <a:rPr lang="en-IN" smtClean="0"/>
-              <a:t>19-03-2025</a:t>
+              <a:t>20-03-2025</a:t>
             </a:fld>
             <a:endParaRPr lang="en-IN"/>
           </a:p>
@@ -2464,7 +2469,7 @@
           <a:p>
             <a:fld id="{4E50B8B5-583C-4517-BD43-114C0DBA7601}" type="datetimeFigureOut">
               <a:rPr lang="en-IN" smtClean="0"/>
-              <a:t>19-03-2025</a:t>
+              <a:t>20-03-2025</a:t>
             </a:fld>
             <a:endParaRPr lang="en-IN"/>
           </a:p>
@@ -2634,7 +2639,7 @@
           <a:p>
             <a:fld id="{4E50B8B5-583C-4517-BD43-114C0DBA7601}" type="datetimeFigureOut">
               <a:rPr lang="en-IN" smtClean="0"/>
-              <a:t>19-03-2025</a:t>
+              <a:t>20-03-2025</a:t>
             </a:fld>
             <a:endParaRPr lang="en-IN"/>
           </a:p>
@@ -2814,7 +2819,7 @@
           <a:p>
             <a:fld id="{4E50B8B5-583C-4517-BD43-114C0DBA7601}" type="datetimeFigureOut">
               <a:rPr lang="en-IN" smtClean="0"/>
-              <a:t>19-03-2025</a:t>
+              <a:t>20-03-2025</a:t>
             </a:fld>
             <a:endParaRPr lang="en-IN"/>
           </a:p>
@@ -2984,7 +2989,7 @@
           <a:p>
             <a:fld id="{4E50B8B5-583C-4517-BD43-114C0DBA7601}" type="datetimeFigureOut">
               <a:rPr lang="en-IN" smtClean="0"/>
-              <a:t>19-03-2025</a:t>
+              <a:t>20-03-2025</a:t>
             </a:fld>
             <a:endParaRPr lang="en-IN"/>
           </a:p>
@@ -3231,7 +3236,7 @@
           <a:p>
             <a:fld id="{4E50B8B5-583C-4517-BD43-114C0DBA7601}" type="datetimeFigureOut">
               <a:rPr lang="en-IN" smtClean="0"/>
-              <a:t>19-03-2025</a:t>
+              <a:t>20-03-2025</a:t>
             </a:fld>
             <a:endParaRPr lang="en-IN"/>
           </a:p>
@@ -3463,7 +3468,7 @@
           <a:p>
             <a:fld id="{4E50B8B5-583C-4517-BD43-114C0DBA7601}" type="datetimeFigureOut">
               <a:rPr lang="en-IN" smtClean="0"/>
-              <a:t>19-03-2025</a:t>
+              <a:t>20-03-2025</a:t>
             </a:fld>
             <a:endParaRPr lang="en-IN"/>
           </a:p>
@@ -3837,7 +3842,7 @@
           <a:p>
             <a:fld id="{4E50B8B5-583C-4517-BD43-114C0DBA7601}" type="datetimeFigureOut">
               <a:rPr lang="en-IN" smtClean="0"/>
-              <a:t>19-03-2025</a:t>
+              <a:t>20-03-2025</a:t>
             </a:fld>
             <a:endParaRPr lang="en-IN"/>
           </a:p>
@@ -3960,7 +3965,7 @@
           <a:p>
             <a:fld id="{4E50B8B5-583C-4517-BD43-114C0DBA7601}" type="datetimeFigureOut">
               <a:rPr lang="en-IN" smtClean="0"/>
-              <a:t>19-03-2025</a:t>
+              <a:t>20-03-2025</a:t>
             </a:fld>
             <a:endParaRPr lang="en-IN"/>
           </a:p>
@@ -4055,7 +4060,7 @@
           <a:p>
             <a:fld id="{4E50B8B5-583C-4517-BD43-114C0DBA7601}" type="datetimeFigureOut">
               <a:rPr lang="en-IN" smtClean="0"/>
-              <a:t>19-03-2025</a:t>
+              <a:t>20-03-2025</a:t>
             </a:fld>
             <a:endParaRPr lang="en-IN"/>
           </a:p>
@@ -4310,7 +4315,7 @@
           <a:p>
             <a:fld id="{4E50B8B5-583C-4517-BD43-114C0DBA7601}" type="datetimeFigureOut">
               <a:rPr lang="en-IN" smtClean="0"/>
-              <a:t>19-03-2025</a:t>
+              <a:t>20-03-2025</a:t>
             </a:fld>
             <a:endParaRPr lang="en-IN"/>
           </a:p>
@@ -4615,7 +4620,7 @@
           <a:p>
             <a:fld id="{4E50B8B5-583C-4517-BD43-114C0DBA7601}" type="datetimeFigureOut">
               <a:rPr lang="en-IN" smtClean="0"/>
-              <a:t>19-03-2025</a:t>
+              <a:t>20-03-2025</a:t>
             </a:fld>
             <a:endParaRPr lang="en-IN"/>
           </a:p>
@@ -5317,7 +5322,7 @@
           <a:p>
             <a:fld id="{4E50B8B5-583C-4517-BD43-114C0DBA7601}" type="datetimeFigureOut">
               <a:rPr lang="en-IN" smtClean="0"/>
-              <a:t>19-03-2025</a:t>
+              <a:t>20-03-2025</a:t>
             </a:fld>
             <a:endParaRPr lang="en-IN"/>
           </a:p>
@@ -7130,7 +7135,7 @@
         </p:nvSpPr>
         <p:spPr>
           <a:xfrm>
-            <a:off x="677334" y="609600"/>
+            <a:off x="677334" y="122903"/>
             <a:ext cx="8596668" cy="658761"/>
           </a:xfrm>
         </p:spPr>
@@ -7163,8 +7168,8 @@
         </p:nvSpPr>
         <p:spPr>
           <a:xfrm>
-            <a:off x="677334" y="1268361"/>
-            <a:ext cx="8596668" cy="5466736"/>
+            <a:off x="677334" y="781663"/>
+            <a:ext cx="8596668" cy="5953433"/>
           </a:xfrm>
         </p:spPr>
         <p:txBody>
@@ -7187,7 +7192,15 @@
           <a:p>
             <a:r>
               <a:rPr lang="en-US" sz="2200" dirty="0"/>
-              <a:t>Our plan is to leverage advancements in information technology, such as Wi-Fi and Bluetooth wireless technology, to create a more responsive and reliable alert system.</a:t>
+              <a:t>Our plan is to leverage advancements in information technology, such as Wi-Fi and Bluetooth wireless </a:t>
+            </a:r>
+            <a:r>
+              <a:rPr lang="en-US" sz="2200" dirty="0" err="1"/>
+              <a:t>technology,or</a:t>
+            </a:r>
+            <a:r>
+              <a:rPr lang="en-US" sz="2200" dirty="0"/>
+              <a:t> LoRa(Which have a range of ~10 Km) to create a more responsive and reliable alert system.</a:t>
             </a:r>
           </a:p>
           <a:p>

</xml_diff>